<commit_message>
updated powerpoint and mission statement
</commit_message>
<xml_diff>
--- a/Documentation/Presentation1.pptx
+++ b/Documentation/Presentation1.pptx
@@ -9,7 +9,9 @@
     <p:sldId id="257" r:id="rId3"/>
     <p:sldId id="258" r:id="rId4"/>
     <p:sldId id="259" r:id="rId5"/>
-    <p:sldId id="260" r:id="rId6"/>
+    <p:sldId id="262" r:id="rId6"/>
+    <p:sldId id="261" r:id="rId7"/>
+    <p:sldId id="260" r:id="rId8"/>
   </p:sldIdLst>
   <p:sldSz cx="9144000" cy="6858000" type="screen4x3"/>
   <p:notesSz cx="6858000" cy="9144000"/>
@@ -293,7 +295,7 @@
             <a:fld id="{1D8BD707-D9CF-40AE-B4C6-C98DA3205C09}" type="datetimeFigureOut">
               <a:rPr lang="en-US" smtClean="0"/>
               <a:pPr/>
-              <a:t>9/27/2012</a:t>
+              <a:t>10/1/2012</a:t>
             </a:fld>
             <a:endParaRPr lang="en-US" dirty="0"/>
           </a:p>
@@ -460,7 +462,7 @@
             <a:fld id="{1D8BD707-D9CF-40AE-B4C6-C98DA3205C09}" type="datetimeFigureOut">
               <a:rPr lang="en-US" smtClean="0"/>
               <a:pPr/>
-              <a:t>9/27/2012</a:t>
+              <a:t>10/1/2012</a:t>
             </a:fld>
             <a:endParaRPr lang="en-US" dirty="0"/>
           </a:p>
@@ -637,7 +639,7 @@
             <a:fld id="{1D8BD707-D9CF-40AE-B4C6-C98DA3205C09}" type="datetimeFigureOut">
               <a:rPr lang="en-US" smtClean="0"/>
               <a:pPr/>
-              <a:t>9/27/2012</a:t>
+              <a:t>10/1/2012</a:t>
             </a:fld>
             <a:endParaRPr lang="en-US" dirty="0"/>
           </a:p>
@@ -804,7 +806,7 @@
             <a:fld id="{1D8BD707-D9CF-40AE-B4C6-C98DA3205C09}" type="datetimeFigureOut">
               <a:rPr lang="en-US" smtClean="0"/>
               <a:pPr/>
-              <a:t>9/27/2012</a:t>
+              <a:t>10/1/2012</a:t>
             </a:fld>
             <a:endParaRPr lang="en-US" dirty="0"/>
           </a:p>
@@ -1047,7 +1049,7 @@
             <a:fld id="{1D8BD707-D9CF-40AE-B4C6-C98DA3205C09}" type="datetimeFigureOut">
               <a:rPr lang="en-US" smtClean="0"/>
               <a:pPr/>
-              <a:t>9/27/2012</a:t>
+              <a:t>10/1/2012</a:t>
             </a:fld>
             <a:endParaRPr lang="en-US" dirty="0"/>
           </a:p>
@@ -1332,7 +1334,7 @@
             <a:fld id="{1D8BD707-D9CF-40AE-B4C6-C98DA3205C09}" type="datetimeFigureOut">
               <a:rPr lang="en-US" smtClean="0"/>
               <a:pPr/>
-              <a:t>9/27/2012</a:t>
+              <a:t>10/1/2012</a:t>
             </a:fld>
             <a:endParaRPr lang="en-US" dirty="0"/>
           </a:p>
@@ -1751,7 +1753,7 @@
             <a:fld id="{1D8BD707-D9CF-40AE-B4C6-C98DA3205C09}" type="datetimeFigureOut">
               <a:rPr lang="en-US" smtClean="0"/>
               <a:pPr/>
-              <a:t>9/27/2012</a:t>
+              <a:t>10/1/2012</a:t>
             </a:fld>
             <a:endParaRPr lang="en-US" dirty="0"/>
           </a:p>
@@ -1866,7 +1868,7 @@
             <a:fld id="{1D8BD707-D9CF-40AE-B4C6-C98DA3205C09}" type="datetimeFigureOut">
               <a:rPr lang="en-US" smtClean="0"/>
               <a:pPr/>
-              <a:t>9/27/2012</a:t>
+              <a:t>10/1/2012</a:t>
             </a:fld>
             <a:endParaRPr lang="en-US" dirty="0"/>
           </a:p>
@@ -1958,7 +1960,7 @@
             <a:fld id="{1D8BD707-D9CF-40AE-B4C6-C98DA3205C09}" type="datetimeFigureOut">
               <a:rPr lang="en-US" smtClean="0"/>
               <a:pPr/>
-              <a:t>9/27/2012</a:t>
+              <a:t>10/1/2012</a:t>
             </a:fld>
             <a:endParaRPr lang="en-US" dirty="0"/>
           </a:p>
@@ -2232,7 +2234,7 @@
             <a:fld id="{1D8BD707-D9CF-40AE-B4C6-C98DA3205C09}" type="datetimeFigureOut">
               <a:rPr lang="en-US" smtClean="0"/>
               <a:pPr/>
-              <a:t>9/27/2012</a:t>
+              <a:t>10/1/2012</a:t>
             </a:fld>
             <a:endParaRPr lang="en-US" dirty="0"/>
           </a:p>
@@ -2482,7 +2484,7 @@
             <a:fld id="{1D8BD707-D9CF-40AE-B4C6-C98DA3205C09}" type="datetimeFigureOut">
               <a:rPr lang="en-US" smtClean="0"/>
               <a:pPr/>
-              <a:t>9/27/2012</a:t>
+              <a:t>10/1/2012</a:t>
             </a:fld>
             <a:endParaRPr lang="en-US" dirty="0"/>
           </a:p>
@@ -2692,7 +2694,7 @@
             <a:fld id="{1D8BD707-D9CF-40AE-B4C6-C98DA3205C09}" type="datetimeFigureOut">
               <a:rPr lang="en-US" smtClean="0"/>
               <a:pPr/>
-              <a:t>9/27/2012</a:t>
+              <a:t>10/1/2012</a:t>
             </a:fld>
             <a:endParaRPr lang="en-US" dirty="0"/>
           </a:p>
@@ -3173,21 +3175,158 @@
         </p:nvSpPr>
         <p:spPr/>
         <p:txBody>
-          <a:bodyPr/>
-          <a:lstStyle/>
-          <a:p>
-            <a:r>
-              <a:rPr lang="en-US" dirty="0" smtClean="0"/>
-              <a:t>Innovative Systems</a:t>
-            </a:r>
-          </a:p>
-          <a:p>
-            <a:r>
-              <a:rPr lang="en-US" dirty="0" smtClean="0"/>
-              <a:t>eBill and eLation services</a:t>
-            </a:r>
-          </a:p>
-          <a:p>
+          <a:bodyPr>
+            <a:normAutofit fontScale="55000" lnSpcReduction="20000"/>
+          </a:bodyPr>
+          <a:lstStyle/>
+          <a:p>
+            <a:pPr marL="0" indent="0">
+              <a:buNone/>
+            </a:pPr>
+            <a:r>
+              <a:rPr lang="en-US" sz="3400" b="1" dirty="0" smtClean="0"/>
+              <a:t>Product </a:t>
+            </a:r>
+            <a:r>
+              <a:rPr lang="en-US" sz="3400" b="1" dirty="0"/>
+              <a:t>Description:</a:t>
+            </a:r>
+            <a:r>
+              <a:rPr lang="en-US" sz="3400" dirty="0"/>
+              <a:t> The cross platform mobile apps allow customers to utilize the Elation </a:t>
+            </a:r>
+            <a:r>
+              <a:rPr lang="en-US" sz="3400" dirty="0" err="1"/>
+              <a:t>eBill</a:t>
+            </a:r>
+            <a:r>
+              <a:rPr lang="en-US" sz="3400" dirty="0"/>
+              <a:t> application on their Android and </a:t>
+            </a:r>
+            <a:r>
+              <a:rPr lang="en-US" sz="3400" dirty="0" err="1"/>
+              <a:t>iOS</a:t>
+            </a:r>
+            <a:r>
+              <a:rPr lang="en-US" sz="3400" dirty="0"/>
+              <a:t> mobile </a:t>
+            </a:r>
+            <a:r>
+              <a:rPr lang="en-US" sz="3400" dirty="0" smtClean="0"/>
+              <a:t>devices. </a:t>
+            </a:r>
+          </a:p>
+          <a:p>
+            <a:pPr marL="0" indent="0">
+              <a:buNone/>
+            </a:pPr>
+            <a:endParaRPr lang="en-US" sz="3400" dirty="0" smtClean="0"/>
+          </a:p>
+          <a:p>
+            <a:pPr marL="0" indent="0">
+              <a:buNone/>
+            </a:pPr>
+            <a:r>
+              <a:rPr lang="en-US" sz="3400" b="1" dirty="0" smtClean="0"/>
+              <a:t>Features: </a:t>
+            </a:r>
+            <a:endParaRPr lang="en-US" sz="3400" dirty="0"/>
+          </a:p>
+          <a:p>
+            <a:pPr lvl="0"/>
+            <a:r>
+              <a:rPr lang="en-US" sz="3400" dirty="0" smtClean="0"/>
+              <a:t>Secure </a:t>
+            </a:r>
+            <a:r>
+              <a:rPr lang="en-US" sz="3400" dirty="0"/>
+              <a:t>method of logging into the </a:t>
+            </a:r>
+            <a:r>
+              <a:rPr lang="en-US" sz="3400" dirty="0" smtClean="0"/>
+              <a:t>device</a:t>
+            </a:r>
+          </a:p>
+          <a:p>
+            <a:pPr lvl="0"/>
+            <a:r>
+              <a:rPr lang="en-US" sz="3400" dirty="0" smtClean="0"/>
+              <a:t>Changeable account settings</a:t>
+            </a:r>
+          </a:p>
+          <a:p>
+            <a:pPr lvl="0"/>
+            <a:r>
+              <a:rPr lang="en-US" sz="3400" dirty="0" smtClean="0"/>
+              <a:t>Access to previous billing invoices/service summaries</a:t>
+            </a:r>
+          </a:p>
+          <a:p>
+            <a:pPr lvl="0"/>
+            <a:r>
+              <a:rPr lang="en-US" sz="3400" dirty="0" smtClean="0"/>
+              <a:t>Payment processing</a:t>
+            </a:r>
+          </a:p>
+          <a:p>
+            <a:pPr lvl="0"/>
+            <a:r>
+              <a:rPr lang="en-US" sz="3400" dirty="0" smtClean="0"/>
+              <a:t>Usage statistics</a:t>
+            </a:r>
+          </a:p>
+          <a:p>
+            <a:pPr lvl="0"/>
+            <a:r>
+              <a:rPr lang="en-US" sz="3400" dirty="0" smtClean="0"/>
+              <a:t>Support information</a:t>
+            </a:r>
+          </a:p>
+          <a:p>
+            <a:pPr marL="0" indent="0">
+              <a:buNone/>
+            </a:pPr>
+            <a:endParaRPr lang="en-US" sz="3400" dirty="0"/>
+          </a:p>
+          <a:p>
+            <a:pPr marL="0" indent="0">
+              <a:buNone/>
+            </a:pPr>
+            <a:r>
+              <a:rPr lang="en-US" sz="3400" b="1" dirty="0"/>
+              <a:t>Key Business Goals: </a:t>
+            </a:r>
+            <a:endParaRPr lang="en-US" sz="3400" dirty="0"/>
+          </a:p>
+          <a:p>
+            <a:pPr lvl="0"/>
+            <a:r>
+              <a:rPr lang="en-US" sz="3400" dirty="0"/>
+              <a:t>Add appeal to the already existing Elation product  </a:t>
+            </a:r>
+          </a:p>
+          <a:p>
+            <a:pPr lvl="0"/>
+            <a:r>
+              <a:rPr lang="en-US" sz="3400" dirty="0"/>
+              <a:t>Make app intuitive/easy to use</a:t>
+            </a:r>
+          </a:p>
+          <a:p>
+            <a:pPr lvl="0"/>
+            <a:r>
+              <a:rPr lang="en-US" sz="3400" dirty="0"/>
+              <a:t>Maintain same look and feel between </a:t>
+            </a:r>
+            <a:r>
+              <a:rPr lang="en-US" sz="3400" dirty="0" smtClean="0"/>
+              <a:t>platforms</a:t>
+            </a:r>
+          </a:p>
+          <a:p>
+            <a:pPr marL="0" indent="0">
+              <a:buNone/>
+            </a:pPr>
             <a:endParaRPr lang="en-US" dirty="0"/>
           </a:p>
         </p:txBody>
@@ -3276,8 +3415,20 @@
             <a:pPr lvl="1"/>
             <a:r>
               <a:rPr lang="en-US" dirty="0" smtClean="0"/>
-              <a:t>Different Languages</a:t>
-            </a:r>
+              <a:t>Different </a:t>
+            </a:r>
+            <a:r>
+              <a:rPr lang="en-US" dirty="0" smtClean="0"/>
+              <a:t>Languages</a:t>
+            </a:r>
+          </a:p>
+          <a:p>
+            <a:pPr lvl="1"/>
+            <a:r>
+              <a:rPr lang="en-US" dirty="0" smtClean="0"/>
+              <a:t>Different Devices</a:t>
+            </a:r>
+            <a:endParaRPr lang="en-US" dirty="0" smtClean="0"/>
           </a:p>
           <a:p>
             <a:r>
@@ -3356,22 +3507,248 @@
             <p:ph idx="1"/>
           </p:nvPr>
         </p:nvSpPr>
-        <p:spPr/>
-        <p:txBody>
-          <a:bodyPr/>
-          <a:lstStyle/>
-          <a:p>
-            <a:r>
-              <a:rPr lang="en-US" dirty="0" smtClean="0"/>
-              <a:t>Application User Stories</a:t>
-            </a:r>
-          </a:p>
-          <a:p>
-            <a:r>
-              <a:rPr lang="en-US" dirty="0" smtClean="0"/>
-              <a:t>Business User Stories</a:t>
-            </a:r>
-            <a:endParaRPr lang="en-US" dirty="0"/>
+        <p:spPr>
+          <a:xfrm>
+            <a:off x="457200" y="1371600"/>
+            <a:ext cx="8229600" cy="4754563"/>
+          </a:xfrm>
+        </p:spPr>
+        <p:txBody>
+          <a:bodyPr>
+            <a:normAutofit fontScale="25000" lnSpcReduction="20000"/>
+          </a:bodyPr>
+          <a:lstStyle/>
+          <a:p>
+            <a:pPr marL="0" indent="0">
+              <a:buNone/>
+            </a:pPr>
+            <a:r>
+              <a:rPr lang="en-US" sz="4800" b="1" dirty="0" smtClean="0"/>
+              <a:t>User Stories</a:t>
+            </a:r>
+            <a:endParaRPr lang="en-US" sz="4800" b="1" dirty="0"/>
+          </a:p>
+          <a:p>
+            <a:r>
+              <a:rPr lang="en-US" sz="4800" dirty="0"/>
+              <a:t>As a customer with a telecom that uses Innovative Systems products, I want to change information on my account &lt;change email, change password&gt; from my &lt;</a:t>
+            </a:r>
+            <a:r>
+              <a:rPr lang="en-US" sz="4800" dirty="0" err="1"/>
+              <a:t>iOS</a:t>
+            </a:r>
+            <a:r>
+              <a:rPr lang="en-US" sz="4800" dirty="0"/>
+              <a:t> device, Android device&gt;. </a:t>
+            </a:r>
+          </a:p>
+          <a:p>
+            <a:r>
+              <a:rPr lang="en-US" sz="4800" dirty="0" smtClean="0"/>
+              <a:t>As </a:t>
+            </a:r>
+            <a:r>
+              <a:rPr lang="en-US" sz="4800" dirty="0"/>
+              <a:t>a customer with a telecom that uses Innovative Systems products, I want to see my &lt;latest, past&gt; invoice for my account from my &lt;</a:t>
+            </a:r>
+            <a:r>
+              <a:rPr lang="en-US" sz="4800" dirty="0" err="1"/>
+              <a:t>iOS</a:t>
+            </a:r>
+            <a:r>
+              <a:rPr lang="en-US" sz="4800" dirty="0"/>
+              <a:t> device, Android device&gt;. </a:t>
+            </a:r>
+          </a:p>
+          <a:p>
+            <a:r>
+              <a:rPr lang="en-US" sz="4800" dirty="0" smtClean="0"/>
+              <a:t>As </a:t>
+            </a:r>
+            <a:r>
+              <a:rPr lang="en-US" sz="4800" dirty="0"/>
+              <a:t>a customer with a telecom that uses Innovative Systems products, I want to see a summary of his service for his account from his &lt;</a:t>
+            </a:r>
+            <a:r>
+              <a:rPr lang="en-US" sz="4800" dirty="0" err="1"/>
+              <a:t>iOS</a:t>
+            </a:r>
+            <a:r>
+              <a:rPr lang="en-US" sz="4800" dirty="0"/>
+              <a:t> device, Android device&gt;. </a:t>
+            </a:r>
+          </a:p>
+          <a:p>
+            <a:r>
+              <a:rPr lang="en-US" sz="4800" dirty="0" smtClean="0"/>
+              <a:t>As </a:t>
+            </a:r>
+            <a:r>
+              <a:rPr lang="en-US" sz="4800" dirty="0"/>
+              <a:t>a customer with a telecom that uses Innovative Systems products, I want to see the current balance for my account from my &lt;</a:t>
+            </a:r>
+            <a:r>
+              <a:rPr lang="en-US" sz="4800" dirty="0" err="1"/>
+              <a:t>iOS</a:t>
+            </a:r>
+            <a:r>
+              <a:rPr lang="en-US" sz="4800" dirty="0"/>
+              <a:t> device, Android device&gt;. </a:t>
+            </a:r>
+          </a:p>
+          <a:p>
+            <a:r>
+              <a:rPr lang="en-US" sz="4800" dirty="0" smtClean="0"/>
+              <a:t>As </a:t>
+            </a:r>
+            <a:r>
+              <a:rPr lang="en-US" sz="4800" dirty="0"/>
+              <a:t>a customer with a telecom that uses Innovative Systems products, I want to make a payment on my balance for my account from my &lt;</a:t>
+            </a:r>
+            <a:r>
+              <a:rPr lang="en-US" sz="4800" dirty="0" err="1"/>
+              <a:t>iOS</a:t>
+            </a:r>
+            <a:r>
+              <a:rPr lang="en-US" sz="4800" dirty="0"/>
+              <a:t> device, Android device&gt;. </a:t>
+            </a:r>
+          </a:p>
+          <a:p>
+            <a:r>
+              <a:rPr lang="en-US" sz="4800" dirty="0" smtClean="0"/>
+              <a:t>As </a:t>
+            </a:r>
+            <a:r>
+              <a:rPr lang="en-US" sz="4800" dirty="0"/>
+              <a:t>a customer with a telecom that uses Innovative Systems products, I want to set up recurring payments for my account from my &lt;</a:t>
+            </a:r>
+            <a:r>
+              <a:rPr lang="en-US" sz="4800" dirty="0" err="1"/>
+              <a:t>iOS</a:t>
+            </a:r>
+            <a:r>
+              <a:rPr lang="en-US" sz="4800" dirty="0"/>
+              <a:t> device, Android device&gt;. </a:t>
+            </a:r>
+          </a:p>
+          <a:p>
+            <a:r>
+              <a:rPr lang="en-US" sz="4800" dirty="0" smtClean="0"/>
+              <a:t>As </a:t>
+            </a:r>
+            <a:r>
+              <a:rPr lang="en-US" sz="4800" dirty="0"/>
+              <a:t>a customer with a telecom that uses Innovative Systems products, I want to see a history of my payments for my account from my &lt;</a:t>
+            </a:r>
+            <a:r>
+              <a:rPr lang="en-US" sz="4800" dirty="0" err="1"/>
+              <a:t>iOS</a:t>
+            </a:r>
+            <a:r>
+              <a:rPr lang="en-US" sz="4800" dirty="0"/>
+              <a:t> device, Android device&gt;. </a:t>
+            </a:r>
+          </a:p>
+          <a:p>
+            <a:r>
+              <a:rPr lang="en-US" sz="4800" dirty="0" smtClean="0"/>
+              <a:t>As </a:t>
+            </a:r>
+            <a:r>
+              <a:rPr lang="en-US" sz="4800" dirty="0"/>
+              <a:t>a customer with a telecom that uses Innovative Systems products, I want to see a summary of my usage for this month on for my plan from my &lt;</a:t>
+            </a:r>
+            <a:r>
+              <a:rPr lang="en-US" sz="4800" dirty="0" err="1"/>
+              <a:t>iOS</a:t>
+            </a:r>
+            <a:r>
+              <a:rPr lang="en-US" sz="4800" dirty="0"/>
+              <a:t> device, Android device&gt;.  I want to see the data, minutes, and text messages that I have used up from my monthly quota in an easy to understand format</a:t>
+            </a:r>
+            <a:r>
+              <a:rPr lang="en-US" sz="4800" dirty="0" smtClean="0"/>
+              <a:t>.</a:t>
+            </a:r>
+          </a:p>
+          <a:p>
+            <a:r>
+              <a:rPr lang="en-US" sz="4800" dirty="0"/>
+              <a:t>As a customer with a telecom that uses Innovative Systems products, I want to submit a trouble ticket because &lt;Innovative Systems product&gt; of mine is broken, and I want to do it from my &lt;</a:t>
+            </a:r>
+            <a:r>
+              <a:rPr lang="en-US" sz="4800" dirty="0" err="1"/>
+              <a:t>iOS</a:t>
+            </a:r>
+            <a:r>
+              <a:rPr lang="en-US" sz="4800" dirty="0"/>
+              <a:t> device, Android device&gt;. </a:t>
+            </a:r>
+            <a:endParaRPr lang="en-US" sz="4800" dirty="0"/>
+          </a:p>
+          <a:p>
+            <a:pPr marL="0" indent="0">
+              <a:buNone/>
+            </a:pPr>
+            <a:endParaRPr lang="en-US" sz="4800" dirty="0" smtClean="0"/>
+          </a:p>
+          <a:p>
+            <a:pPr marL="0" indent="0">
+              <a:buNone/>
+            </a:pPr>
+            <a:r>
+              <a:rPr lang="en-US" sz="4800" b="1" dirty="0" smtClean="0"/>
+              <a:t>Business User </a:t>
+            </a:r>
+            <a:r>
+              <a:rPr lang="en-US" sz="4800" b="1" dirty="0" smtClean="0"/>
+              <a:t>Stories</a:t>
+            </a:r>
+          </a:p>
+          <a:p>
+            <a:r>
+              <a:rPr lang="en-US" sz="4800" dirty="0" smtClean="0"/>
+              <a:t>As </a:t>
+            </a:r>
+            <a:r>
+              <a:rPr lang="en-US" sz="4800" dirty="0"/>
+              <a:t>a customer with a telecom that uses Innovative Systems products, I want to get contact information for the support for my company from my &lt;</a:t>
+            </a:r>
+            <a:r>
+              <a:rPr lang="en-US" sz="4800" dirty="0" err="1"/>
+              <a:t>iOS</a:t>
+            </a:r>
+            <a:r>
+              <a:rPr lang="en-US" sz="4800" dirty="0"/>
+              <a:t> device, Android device&gt;. </a:t>
+            </a:r>
+          </a:p>
+          <a:p>
+            <a:r>
+              <a:rPr lang="en-US" sz="4800" dirty="0"/>
+              <a:t>As a customer with a telecom that uses Innovative Systems products, I have multiple accounts for both my business and my home with the same telecom. I want to be able to easily access the mobile application for both accounts from my &lt;</a:t>
+            </a:r>
+            <a:r>
+              <a:rPr lang="en-US" sz="4800" dirty="0" err="1"/>
+              <a:t>iOS</a:t>
+            </a:r>
+            <a:r>
+              <a:rPr lang="en-US" sz="4800" dirty="0"/>
+              <a:t> device, Android device&gt;.</a:t>
+            </a:r>
+          </a:p>
+          <a:p>
+            <a:r>
+              <a:rPr lang="en-US" sz="4800" dirty="0"/>
+              <a:t>As a telecom that uses Innovative Systems products, I want my customers to see a banner that displays my telecom’s name on the mobile apps that my customers use to check their account information.  </a:t>
+            </a:r>
+          </a:p>
+          <a:p>
+            <a:pPr marL="0" indent="0">
+              <a:buNone/>
+            </a:pPr>
+            <a:endParaRPr lang="en-US" b="1" dirty="0"/>
           </a:p>
         </p:txBody>
       </p:sp>
@@ -3422,6 +3799,364 @@
           <a:p>
             <a:r>
               <a:rPr lang="en-US" dirty="0" smtClean="0"/>
+              <a:t>Analysis</a:t>
+            </a:r>
+            <a:endParaRPr lang="en-US" dirty="0"/>
+          </a:p>
+        </p:txBody>
+      </p:sp>
+      <p:sp>
+        <p:nvSpPr>
+          <p:cNvPr id="3" name="Content Placeholder 2"/>
+          <p:cNvSpPr>
+            <a:spLocks noGrp="1"/>
+          </p:cNvSpPr>
+          <p:nvPr>
+            <p:ph idx="1"/>
+          </p:nvPr>
+        </p:nvSpPr>
+        <p:spPr/>
+        <p:txBody>
+          <a:bodyPr/>
+          <a:lstStyle/>
+          <a:p>
+            <a:r>
+              <a:rPr lang="en-US" dirty="0" smtClean="0"/>
+              <a:t>Created desired look and feel </a:t>
+            </a:r>
+          </a:p>
+          <a:p>
+            <a:pPr marL="0" indent="0">
+              <a:buNone/>
+            </a:pPr>
+            <a:r>
+              <a:rPr lang="en-US" dirty="0" smtClean="0"/>
+              <a:t>	- via white board at Innovative Systems</a:t>
+            </a:r>
+          </a:p>
+          <a:p>
+            <a:r>
+              <a:rPr lang="en-US" dirty="0" smtClean="0"/>
+              <a:t>Using two Mac’s and one PC for development</a:t>
+            </a:r>
+          </a:p>
+          <a:p>
+            <a:r>
+              <a:rPr lang="en-US" dirty="0" smtClean="0"/>
+              <a:t>Versions Repository </a:t>
+            </a:r>
+            <a:endParaRPr lang="en-US" dirty="0"/>
+          </a:p>
+        </p:txBody>
+      </p:sp>
+    </p:spTree>
+    <p:extLst>
+      <p:ext uri="{BB962C8B-B14F-4D97-AF65-F5344CB8AC3E}">
+        <p14:creationId xmlns:p14="http://schemas.microsoft.com/office/powerpoint/2010/main" val="1195824612"/>
+      </p:ext>
+    </p:extLst>
+  </p:cSld>
+  <p:clrMapOvr>
+    <a:masterClrMapping/>
+  </p:clrMapOvr>
+</p:sld>
+</file>
+
+<file path=ppt/slides/slide6.xml><?xml version="1.0" encoding="utf-8"?>
+<p:sld xmlns:a="http://schemas.openxmlformats.org/drawingml/2006/main" xmlns:r="http://schemas.openxmlformats.org/officeDocument/2006/relationships" xmlns:p="http://schemas.openxmlformats.org/presentationml/2006/main">
+  <p:cSld>
+    <p:spTree>
+      <p:nvGrpSpPr>
+        <p:cNvPr id="1" name=""/>
+        <p:cNvGrpSpPr/>
+        <p:nvPr/>
+      </p:nvGrpSpPr>
+      <p:grpSpPr>
+        <a:xfrm>
+          <a:off x="0" y="0"/>
+          <a:ext cx="0" cy="0"/>
+          <a:chOff x="0" y="0"/>
+          <a:chExt cx="0" cy="0"/>
+        </a:xfrm>
+      </p:grpSpPr>
+      <p:sp>
+        <p:nvSpPr>
+          <p:cNvPr id="2" name="Title 1"/>
+          <p:cNvSpPr>
+            <a:spLocks noGrp="1"/>
+          </p:cNvSpPr>
+          <p:nvPr>
+            <p:ph type="title"/>
+          </p:nvPr>
+        </p:nvSpPr>
+        <p:spPr/>
+        <p:txBody>
+          <a:bodyPr/>
+          <a:lstStyle/>
+          <a:p>
+            <a:r>
+              <a:rPr lang="en-US" dirty="0" smtClean="0"/>
+              <a:t>Sprints</a:t>
+            </a:r>
+            <a:endParaRPr lang="en-US" dirty="0"/>
+          </a:p>
+        </p:txBody>
+      </p:sp>
+      <p:sp>
+        <p:nvSpPr>
+          <p:cNvPr id="3" name="Content Placeholder 2"/>
+          <p:cNvSpPr>
+            <a:spLocks noGrp="1"/>
+          </p:cNvSpPr>
+          <p:nvPr>
+            <p:ph idx="1"/>
+          </p:nvPr>
+        </p:nvSpPr>
+        <p:spPr>
+          <a:xfrm>
+            <a:off x="457200" y="1447800"/>
+            <a:ext cx="8229600" cy="4678363"/>
+          </a:xfrm>
+        </p:spPr>
+        <p:txBody>
+          <a:bodyPr>
+            <a:normAutofit fontScale="47500" lnSpcReduction="20000"/>
+          </a:bodyPr>
+          <a:lstStyle/>
+          <a:p>
+            <a:pPr marL="0" indent="0">
+              <a:buNone/>
+            </a:pPr>
+            <a:r>
+              <a:rPr lang="en-US" b="1" dirty="0" smtClean="0"/>
+              <a:t>Sprint </a:t>
+            </a:r>
+            <a:r>
+              <a:rPr lang="en-US" b="1" dirty="0"/>
+              <a:t>1: September 19, 2012 – October 3, 2012</a:t>
+            </a:r>
+          </a:p>
+          <a:p>
+            <a:pPr lvl="0"/>
+            <a:r>
+              <a:rPr lang="en-US" dirty="0"/>
+              <a:t>Environment Setup</a:t>
+            </a:r>
+          </a:p>
+          <a:p>
+            <a:pPr lvl="1"/>
+            <a:r>
+              <a:rPr lang="en-US" dirty="0"/>
+              <a:t>Set up IDEs on Mac, Windows</a:t>
+            </a:r>
+          </a:p>
+          <a:p>
+            <a:pPr lvl="1"/>
+            <a:r>
+              <a:rPr lang="en-US" dirty="0"/>
+              <a:t>Set up code repository</a:t>
+            </a:r>
+          </a:p>
+          <a:p>
+            <a:pPr lvl="0"/>
+            <a:r>
+              <a:rPr lang="en-US" dirty="0"/>
+              <a:t>Development</a:t>
+            </a:r>
+          </a:p>
+          <a:p>
+            <a:pPr lvl="1"/>
+            <a:r>
+              <a:rPr lang="en-US" dirty="0"/>
+              <a:t>Build test SOAP communication to Android and </a:t>
+            </a:r>
+            <a:r>
+              <a:rPr lang="en-US" dirty="0" err="1"/>
+              <a:t>iOS</a:t>
+            </a:r>
+            <a:r>
+              <a:rPr lang="en-US" dirty="0"/>
+              <a:t> devices</a:t>
+            </a:r>
+          </a:p>
+          <a:p>
+            <a:pPr lvl="1"/>
+            <a:r>
+              <a:rPr lang="en-US" dirty="0"/>
+              <a:t>Build Android and </a:t>
+            </a:r>
+            <a:r>
+              <a:rPr lang="en-US" dirty="0" err="1"/>
+              <a:t>iOS</a:t>
+            </a:r>
+            <a:r>
+              <a:rPr lang="en-US" dirty="0"/>
+              <a:t> layout</a:t>
+            </a:r>
+          </a:p>
+          <a:p>
+            <a:pPr lvl="0"/>
+            <a:r>
+              <a:rPr lang="en-US" dirty="0"/>
+              <a:t>Documents</a:t>
+            </a:r>
+          </a:p>
+          <a:p>
+            <a:pPr lvl="1"/>
+            <a:r>
+              <a:rPr lang="en-US" dirty="0"/>
+              <a:t>Team Name</a:t>
+            </a:r>
+          </a:p>
+          <a:p>
+            <a:pPr lvl="1"/>
+            <a:r>
+              <a:rPr lang="en-US" dirty="0"/>
+              <a:t>Design Document</a:t>
+            </a:r>
+          </a:p>
+          <a:p>
+            <a:pPr lvl="1"/>
+            <a:r>
+              <a:rPr lang="en-US" dirty="0"/>
+              <a:t>Software Contract</a:t>
+            </a:r>
+          </a:p>
+          <a:p>
+            <a:pPr lvl="1"/>
+            <a:r>
+              <a:rPr lang="en-US" dirty="0"/>
+              <a:t>Mission Statement</a:t>
+            </a:r>
+          </a:p>
+          <a:p>
+            <a:pPr lvl="1"/>
+            <a:r>
+              <a:rPr lang="en-US" dirty="0"/>
+              <a:t>CONOPS</a:t>
+            </a:r>
+          </a:p>
+          <a:p>
+            <a:pPr lvl="1"/>
+            <a:r>
+              <a:rPr lang="en-US" dirty="0"/>
+              <a:t>User </a:t>
+            </a:r>
+            <a:r>
+              <a:rPr lang="en-US" dirty="0" smtClean="0"/>
+              <a:t>Stories</a:t>
+            </a:r>
+          </a:p>
+          <a:p>
+            <a:pPr marL="457200" lvl="1" indent="0">
+              <a:buNone/>
+            </a:pPr>
+            <a:endParaRPr lang="en-US" dirty="0"/>
+          </a:p>
+          <a:p>
+            <a:pPr marL="0" indent="0">
+              <a:buNone/>
+            </a:pPr>
+            <a:r>
+              <a:rPr lang="en-US" b="1" dirty="0" smtClean="0"/>
+              <a:t>Sprint </a:t>
+            </a:r>
+            <a:r>
+              <a:rPr lang="en-US" b="1" dirty="0"/>
+              <a:t>2: October 10, 2012 – October 31, 2012</a:t>
+            </a:r>
+          </a:p>
+          <a:p>
+            <a:pPr lvl="0"/>
+            <a:r>
+              <a:rPr lang="en-US" dirty="0"/>
+              <a:t>Environment</a:t>
+            </a:r>
+          </a:p>
+          <a:p>
+            <a:pPr lvl="1"/>
+            <a:r>
+              <a:rPr lang="en-US" dirty="0"/>
+              <a:t>Get </a:t>
+            </a:r>
+            <a:r>
+              <a:rPr lang="en-US" dirty="0" err="1"/>
+              <a:t>eBill</a:t>
+            </a:r>
+            <a:r>
+              <a:rPr lang="en-US" dirty="0"/>
+              <a:t> service installed on local server for testing</a:t>
+            </a:r>
+          </a:p>
+          <a:p>
+            <a:pPr lvl="0"/>
+            <a:r>
+              <a:rPr lang="en-US" dirty="0"/>
+              <a:t>Development</a:t>
+            </a:r>
+          </a:p>
+          <a:p>
+            <a:pPr lvl="0"/>
+            <a:r>
+              <a:rPr lang="en-US" dirty="0"/>
+              <a:t>Documents</a:t>
+            </a:r>
+          </a:p>
+          <a:p>
+            <a:pPr marL="0" indent="0">
+              <a:buNone/>
+            </a:pPr>
+            <a:endParaRPr lang="en-US" dirty="0"/>
+          </a:p>
+        </p:txBody>
+      </p:sp>
+    </p:spTree>
+    <p:extLst>
+      <p:ext uri="{BB962C8B-B14F-4D97-AF65-F5344CB8AC3E}">
+        <p14:creationId xmlns:p14="http://schemas.microsoft.com/office/powerpoint/2010/main" val="1540282650"/>
+      </p:ext>
+    </p:extLst>
+  </p:cSld>
+  <p:clrMapOvr>
+    <a:masterClrMapping/>
+  </p:clrMapOvr>
+</p:sld>
+</file>
+
+<file path=ppt/slides/slide7.xml><?xml version="1.0" encoding="utf-8"?>
+<p:sld xmlns:a="http://schemas.openxmlformats.org/drawingml/2006/main" xmlns:r="http://schemas.openxmlformats.org/officeDocument/2006/relationships" xmlns:p="http://schemas.openxmlformats.org/presentationml/2006/main">
+  <p:cSld>
+    <p:spTree>
+      <p:nvGrpSpPr>
+        <p:cNvPr id="1" name=""/>
+        <p:cNvGrpSpPr/>
+        <p:nvPr/>
+      </p:nvGrpSpPr>
+      <p:grpSpPr>
+        <a:xfrm>
+          <a:off x="0" y="0"/>
+          <a:ext cx="0" cy="0"/>
+          <a:chOff x="0" y="0"/>
+          <a:chExt cx="0" cy="0"/>
+        </a:xfrm>
+      </p:grpSpPr>
+      <p:sp>
+        <p:nvSpPr>
+          <p:cNvPr id="2" name="Title 1"/>
+          <p:cNvSpPr>
+            <a:spLocks noGrp="1"/>
+          </p:cNvSpPr>
+          <p:nvPr>
+            <p:ph type="title"/>
+          </p:nvPr>
+        </p:nvSpPr>
+        <p:spPr/>
+        <p:txBody>
+          <a:bodyPr/>
+          <a:lstStyle/>
+          <a:p>
+            <a:r>
+              <a:rPr lang="en-US" dirty="0" smtClean="0"/>
               <a:t>Design and Architecture</a:t>
             </a:r>
             <a:endParaRPr lang="en-US" dirty="0"/>
@@ -3443,6 +4178,10 @@
           <a:bodyPr/>
           <a:lstStyle/>
           <a:p>
+            <a:r>
+              <a:rPr lang="en-US" dirty="0" smtClean="0"/>
+              <a:t>Prototypes/screen shots</a:t>
+            </a:r>
             <a:endParaRPr lang="en-US" dirty="0"/>
           </a:p>
         </p:txBody>

</xml_diff>

<commit_message>
Minor update to presentation, sprint 1 report
</commit_message>
<xml_diff>
--- a/Documentation/Presentation1.pptx
+++ b/Documentation/Presentation1.pptx
@@ -741,7 +741,7 @@
             <a:fld id="{1D8BD707-D9CF-40AE-B4C6-C98DA3205C09}" type="datetimeFigureOut">
               <a:rPr lang="en-US" smtClean="0"/>
               <a:pPr/>
-              <a:t>10/2/2012</a:t>
+              <a:t>10/4/2012</a:t>
             </a:fld>
             <a:endParaRPr lang="en-US" dirty="0"/>
           </a:p>
@@ -939,7 +939,7 @@
             <a:fld id="{1D8BD707-D9CF-40AE-B4C6-C98DA3205C09}" type="datetimeFigureOut">
               <a:rPr lang="en-US" smtClean="0"/>
               <a:pPr/>
-              <a:t>10/2/2012</a:t>
+              <a:t>10/4/2012</a:t>
             </a:fld>
             <a:endParaRPr lang="en-US" dirty="0"/>
           </a:p>
@@ -1126,7 +1126,7 @@
             <a:fld id="{1D8BD707-D9CF-40AE-B4C6-C98DA3205C09}" type="datetimeFigureOut">
               <a:rPr lang="en-US" smtClean="0"/>
               <a:pPr/>
-              <a:t>10/2/2012</a:t>
+              <a:t>10/4/2012</a:t>
             </a:fld>
             <a:endParaRPr lang="en-US" dirty="0"/>
           </a:p>
@@ -1278,7 +1278,7 @@
             <a:fld id="{1D8BD707-D9CF-40AE-B4C6-C98DA3205C09}" type="datetimeFigureOut">
               <a:rPr lang="en-US" smtClean="0"/>
               <a:pPr/>
-              <a:t>10/2/2012</a:t>
+              <a:t>10/4/2012</a:t>
             </a:fld>
             <a:endParaRPr lang="en-US" dirty="0"/>
           </a:p>
@@ -1535,7 +1535,7 @@
             <a:fld id="{1D8BD707-D9CF-40AE-B4C6-C98DA3205C09}" type="datetimeFigureOut">
               <a:rPr lang="en-US" smtClean="0"/>
               <a:pPr/>
-              <a:t>10/2/2012</a:t>
+              <a:t>10/4/2012</a:t>
             </a:fld>
             <a:endParaRPr lang="en-US" dirty="0"/>
           </a:p>
@@ -1946,7 +1946,7 @@
             <a:fld id="{1D8BD707-D9CF-40AE-B4C6-C98DA3205C09}" type="datetimeFigureOut">
               <a:rPr lang="en-US" smtClean="0"/>
               <a:pPr/>
-              <a:t>10/2/2012</a:t>
+              <a:t>10/4/2012</a:t>
             </a:fld>
             <a:endParaRPr lang="en-US" dirty="0"/>
           </a:p>
@@ -2394,7 +2394,7 @@
             <a:fld id="{1D8BD707-D9CF-40AE-B4C6-C98DA3205C09}" type="datetimeFigureOut">
               <a:rPr lang="en-US" smtClean="0"/>
               <a:pPr/>
-              <a:t>10/2/2012</a:t>
+              <a:t>10/4/2012</a:t>
             </a:fld>
             <a:endParaRPr lang="en-US" dirty="0"/>
           </a:p>
@@ -2497,7 +2497,7 @@
             <a:fld id="{1D8BD707-D9CF-40AE-B4C6-C98DA3205C09}" type="datetimeFigureOut">
               <a:rPr lang="en-US" smtClean="0"/>
               <a:pPr/>
-              <a:t>10/2/2012</a:t>
+              <a:t>10/4/2012</a:t>
             </a:fld>
             <a:endParaRPr lang="en-US" dirty="0"/>
           </a:p>
@@ -2620,7 +2620,7 @@
             <a:fld id="{1D8BD707-D9CF-40AE-B4C6-C98DA3205C09}" type="datetimeFigureOut">
               <a:rPr lang="en-US" smtClean="0"/>
               <a:pPr/>
-              <a:t>10/2/2012</a:t>
+              <a:t>10/4/2012</a:t>
             </a:fld>
             <a:endParaRPr lang="en-US" dirty="0"/>
           </a:p>
@@ -2896,7 +2896,7 @@
             <a:fld id="{1D8BD707-D9CF-40AE-B4C6-C98DA3205C09}" type="datetimeFigureOut">
               <a:rPr lang="en-US" smtClean="0"/>
               <a:pPr/>
-              <a:t>10/2/2012</a:t>
+              <a:t>10/4/2012</a:t>
             </a:fld>
             <a:endParaRPr lang="en-US" dirty="0"/>
           </a:p>
@@ -3103,7 +3103,7 @@
             <a:fld id="{1D8BD707-D9CF-40AE-B4C6-C98DA3205C09}" type="datetimeFigureOut">
               <a:rPr lang="en-US" smtClean="0"/>
               <a:pPr/>
-              <a:t>10/2/2012</a:t>
+              <a:t>10/4/2012</a:t>
             </a:fld>
             <a:endParaRPr lang="en-US" dirty="0"/>
           </a:p>
@@ -4214,7 +4214,7 @@
             <a:fld id="{1D8BD707-D9CF-40AE-B4C6-C98DA3205C09}" type="datetimeFigureOut">
               <a:rPr lang="en-US" smtClean="0"/>
               <a:pPr/>
-              <a:t>10/2/2012</a:t>
+              <a:t>10/4/2012</a:t>
             </a:fld>
             <a:endParaRPr lang="en-US" dirty="0"/>
           </a:p>
@@ -5098,15 +5098,39 @@
             </a:r>
             <a:r>
               <a:rPr lang="en-US" sz="5200" dirty="0"/>
-              <a:t>a customer with a telecom that uses Innovative Systems products, I want to see a summary of his service for his account from his &lt;</a:t>
-            </a:r>
-            <a:r>
-              <a:rPr lang="en-US" sz="5200" dirty="0" err="1"/>
-              <a:t>iOS</a:t>
+              <a:t>a customer with a telecom that uses Innovative Systems products, I want to see a summary of </a:t>
+            </a:r>
+            <a:r>
+              <a:rPr lang="en-US" sz="5200" dirty="0" smtClean="0"/>
+              <a:t>my </a:t>
             </a:r>
             <a:r>
               <a:rPr lang="en-US" sz="5200" dirty="0"/>
-              <a:t> device, Android device&gt;. </a:t>
+              <a:t>service for </a:t>
+            </a:r>
+            <a:r>
+              <a:rPr lang="en-US" sz="5200" dirty="0" smtClean="0"/>
+              <a:t>my</a:t>
+            </a:r>
+            <a:r>
+              <a:rPr lang="en-US" sz="5200" dirty="0" smtClean="0"/>
+              <a:t> </a:t>
+            </a:r>
+            <a:r>
+              <a:rPr lang="en-US" sz="5200" dirty="0"/>
+              <a:t>account from </a:t>
+            </a:r>
+            <a:r>
+              <a:rPr lang="en-US" sz="5200" dirty="0" smtClean="0"/>
+              <a:t>my</a:t>
+            </a:r>
+            <a:r>
+              <a:rPr lang="en-US" sz="5200" dirty="0" smtClean="0"/>
+              <a:t> </a:t>
+            </a:r>
+            <a:r>
+              <a:rPr lang="en-US" sz="5200" dirty="0"/>
+              <a:t>&lt;iOS device, Android device&gt;. </a:t>
             </a:r>
           </a:p>
           <a:p>
@@ -5290,7 +5314,7 @@
         <p:spPr/>
         <p:txBody>
           <a:bodyPr>
-            <a:normAutofit lnSpcReduction="10000"/>
+            <a:normAutofit fontScale="92500" lnSpcReduction="10000"/>
           </a:bodyPr>
           <a:lstStyle/>
           <a:p>
@@ -5308,10 +5332,16 @@
           <a:p>
             <a:pPr lvl="1"/>
             <a:r>
-              <a:rPr lang="en-US" dirty="0"/>
-              <a:t>?</a:t>
-            </a:r>
-            <a:endParaRPr lang="en-US" dirty="0" smtClean="0"/>
+              <a:rPr lang="en-US" dirty="0" smtClean="0"/>
+              <a:t>Eclipse, Android SDK</a:t>
+            </a:r>
+          </a:p>
+          <a:p>
+            <a:pPr lvl="1"/>
+            <a:r>
+              <a:rPr lang="en-US" dirty="0" smtClean="0"/>
+              <a:t>Samsung Galaxy SIII, Nexus 7</a:t>
+            </a:r>
           </a:p>
           <a:p>
             <a:r>
@@ -5340,7 +5370,11 @@
             <a:pPr lvl="1"/>
             <a:r>
               <a:rPr lang="en-US" dirty="0" smtClean="0"/>
-              <a:t>iPod</a:t>
+              <a:t>iPod, </a:t>
+            </a:r>
+            <a:r>
+              <a:rPr lang="en-US" dirty="0" err="1" smtClean="0"/>
+              <a:t>iPad</a:t>
             </a:r>
             <a:endParaRPr lang="en-US" dirty="0"/>
           </a:p>
@@ -5354,7 +5388,7 @@
             <a:pPr lvl="1"/>
             <a:r>
               <a:rPr lang="en-US" dirty="0" smtClean="0"/>
-              <a:t>API ?</a:t>
+              <a:t>API</a:t>
             </a:r>
           </a:p>
           <a:p>
@@ -5367,7 +5401,7 @@
             <a:pPr lvl="1"/>
             <a:r>
               <a:rPr lang="en-US" dirty="0" smtClean="0"/>
-              <a:t>Versions: Code Repository</a:t>
+              <a:t>Versions SVN: Code Repository</a:t>
             </a:r>
           </a:p>
           <a:p>

</xml_diff>

<commit_message>
small changes, updates... ?
</commit_message>
<xml_diff>
--- a/Documentation/Presentation1.pptx
+++ b/Documentation/Presentation1.pptx
@@ -14,6 +14,7 @@
     <p:sldId id="264" r:id="rId8"/>
     <p:sldId id="260" r:id="rId9"/>
     <p:sldId id="265" r:id="rId10"/>
+    <p:sldId id="266" r:id="rId11"/>
   </p:sldIdLst>
   <p:sldSz cx="9144000" cy="6858000" type="screen4x3"/>
   <p:notesSz cx="6858000" cy="9144000"/>
@@ -4680,6 +4681,90 @@
 </p:sld>
 </file>
 
+<file path=ppt/slides/slide10.xml><?xml version="1.0" encoding="utf-8"?>
+<p:sld xmlns:a="http://schemas.openxmlformats.org/drawingml/2006/main" xmlns:r="http://schemas.openxmlformats.org/officeDocument/2006/relationships" xmlns:p="http://schemas.openxmlformats.org/presentationml/2006/main">
+  <p:cSld>
+    <p:spTree>
+      <p:nvGrpSpPr>
+        <p:cNvPr id="1" name=""/>
+        <p:cNvGrpSpPr/>
+        <p:nvPr/>
+      </p:nvGrpSpPr>
+      <p:grpSpPr>
+        <a:xfrm>
+          <a:off x="0" y="0"/>
+          <a:ext cx="0" cy="0"/>
+          <a:chOff x="0" y="0"/>
+          <a:chExt cx="0" cy="0"/>
+        </a:xfrm>
+      </p:grpSpPr>
+      <p:sp>
+        <p:nvSpPr>
+          <p:cNvPr id="2" name="Content Placeholder 1"/>
+          <p:cNvSpPr>
+            <a:spLocks noGrp="1"/>
+          </p:cNvSpPr>
+          <p:nvPr>
+            <p:ph idx="1"/>
+          </p:nvPr>
+        </p:nvSpPr>
+        <p:spPr/>
+        <p:txBody>
+          <a:bodyPr/>
+          <a:lstStyle/>
+          <a:p>
+            <a:r>
+              <a:rPr lang="en-US" dirty="0" smtClean="0"/>
+              <a:t>JSON</a:t>
+            </a:r>
+          </a:p>
+          <a:p>
+            <a:r>
+              <a:rPr lang="en-US" dirty="0" smtClean="0"/>
+              <a:t>Web Service</a:t>
+            </a:r>
+          </a:p>
+          <a:p>
+            <a:endParaRPr lang="en-US" dirty="0"/>
+          </a:p>
+        </p:txBody>
+      </p:sp>
+      <p:sp>
+        <p:nvSpPr>
+          <p:cNvPr id="3" name="Title 2"/>
+          <p:cNvSpPr>
+            <a:spLocks noGrp="1"/>
+          </p:cNvSpPr>
+          <p:nvPr>
+            <p:ph type="title"/>
+          </p:nvPr>
+        </p:nvSpPr>
+        <p:spPr/>
+        <p:txBody>
+          <a:bodyPr/>
+          <a:lstStyle/>
+          <a:p>
+            <a:r>
+              <a:rPr lang="en-US" dirty="0" smtClean="0"/>
+              <a:t>Web Service Interface</a:t>
+            </a:r>
+            <a:endParaRPr lang="en-US" dirty="0"/>
+          </a:p>
+        </p:txBody>
+      </p:sp>
+    </p:spTree>
+    <p:extLst>
+      <p:ext uri="{BB962C8B-B14F-4D97-AF65-F5344CB8AC3E}">
+        <p14:creationId xmlns:p14="http://schemas.microsoft.com/office/powerpoint/2010/main" val="3057061253"/>
+      </p:ext>
+    </p:extLst>
+  </p:cSld>
+  <p:clrMapOvr>
+    <a:masterClrMapping/>
+  </p:clrMapOvr>
+</p:sld>
+</file>
+
 <file path=ppt/slides/slide2.xml><?xml version="1.0" encoding="utf-8"?>
 <p:sld xmlns:a="http://schemas.openxmlformats.org/drawingml/2006/main" xmlns:r="http://schemas.openxmlformats.org/officeDocument/2006/relationships" xmlns:p="http://schemas.openxmlformats.org/presentationml/2006/main">
   <p:cSld>
@@ -5110,11 +5195,7 @@
             </a:r>
             <a:r>
               <a:rPr lang="en-US" sz="5200" dirty="0" smtClean="0"/>
-              <a:t>my</a:t>
-            </a:r>
-            <a:r>
-              <a:rPr lang="en-US" sz="5200" dirty="0" smtClean="0"/>
-              <a:t> </a:t>
+              <a:t>my </a:t>
             </a:r>
             <a:r>
               <a:rPr lang="en-US" sz="5200" dirty="0"/>
@@ -5122,11 +5203,7 @@
             </a:r>
             <a:r>
               <a:rPr lang="en-US" sz="5200" dirty="0" smtClean="0"/>
-              <a:t>my</a:t>
-            </a:r>
-            <a:r>
-              <a:rPr lang="en-US" sz="5200" dirty="0" smtClean="0"/>
-              <a:t> </a:t>
+              <a:t>my </a:t>
             </a:r>
             <a:r>
               <a:rPr lang="en-US" sz="5200" dirty="0"/>
@@ -5711,6 +5788,13 @@
   <p:clrMapOvr>
     <a:masterClrMapping/>
   </p:clrMapOvr>
+  <p:timing>
+    <p:tnLst>
+      <p:par>
+        <p:cTn id="1" dur="indefinite" restart="never" nodeType="tmRoot"/>
+      </p:par>
+    </p:tnLst>
+  </p:timing>
 </p:sld>
 </file>
 
@@ -5789,6 +5873,13 @@
   <p:clrMapOvr>
     <a:masterClrMapping/>
   </p:clrMapOvr>
+  <p:timing>
+    <p:tnLst>
+      <p:par>
+        <p:cTn id="1" dur="indefinite" restart="never" nodeType="tmRoot"/>
+      </p:par>
+    </p:tnLst>
+  </p:timing>
 </p:sld>
 </file>
 
@@ -6125,6 +6216,13 @@
   <p:clrMapOvr>
     <a:masterClrMapping/>
   </p:clrMapOvr>
+  <p:timing>
+    <p:tnLst>
+      <p:par>
+        <p:cTn id="1" dur="indefinite" restart="never" nodeType="tmRoot"/>
+      </p:par>
+    </p:tnLst>
+  </p:timing>
 </p:sld>
 </file>
 
@@ -6162,7 +6260,13 @@
           <a:p>
             <a:r>
               <a:rPr lang="en-US" dirty="0" smtClean="0"/>
-              <a:t>Visio Diagram</a:t>
+              <a:t>Overview</a:t>
+            </a:r>
+          </a:p>
+          <a:p>
+            <a:r>
+              <a:rPr lang="en-US" dirty="0" smtClean="0"/>
+              <a:t>Challenges</a:t>
             </a:r>
             <a:endParaRPr lang="en-US" dirty="0"/>
           </a:p>
@@ -6191,6 +6295,36 @@
           </a:p>
         </p:txBody>
       </p:sp>
+      <p:pic>
+        <p:nvPicPr>
+          <p:cNvPr id="4" name="Picture 3"/>
+          <p:cNvPicPr>
+            <a:picLocks noChangeAspect="1"/>
+          </p:cNvPicPr>
+          <p:nvPr/>
+        </p:nvPicPr>
+        <p:blipFill>
+          <a:blip r:embed="rId2">
+            <a:extLst>
+              <a:ext uri="{28A0092B-C50C-407E-A947-70E740481C1C}">
+                <a14:useLocalDpi xmlns:a14="http://schemas.microsoft.com/office/drawing/2010/main" val="0"/>
+              </a:ext>
+            </a:extLst>
+          </a:blip>
+          <a:stretch>
+            <a:fillRect/>
+          </a:stretch>
+        </p:blipFill>
+        <p:spPr>
+          <a:xfrm>
+            <a:off x="3962400" y="838200"/>
+            <a:ext cx="4972744" cy="5525272"/>
+          </a:xfrm>
+          <a:prstGeom prst="rect">
+            <a:avLst/>
+          </a:prstGeom>
+        </p:spPr>
+      </p:pic>
     </p:spTree>
     <p:extLst>
       <p:ext uri="{BB962C8B-B14F-4D97-AF65-F5344CB8AC3E}">
@@ -6201,6 +6335,13 @@
   <p:clrMapOvr>
     <a:masterClrMapping/>
   </p:clrMapOvr>
+  <p:timing>
+    <p:tnLst>
+      <p:par>
+        <p:cTn id="1" dur="indefinite" restart="never" nodeType="tmRoot"/>
+      </p:par>
+    </p:tnLst>
+  </p:timing>
 </p:sld>
 </file>
 

</xml_diff>

<commit_message>
Updates, new PDF for sprint 1 report
</commit_message>
<xml_diff>
--- a/Documentation/Presentation1.pptx
+++ b/Documentation/Presentation1.pptx
@@ -742,7 +742,7 @@
             <a:fld id="{1D8BD707-D9CF-40AE-B4C6-C98DA3205C09}" type="datetimeFigureOut">
               <a:rPr lang="en-US" smtClean="0"/>
               <a:pPr/>
-              <a:t>10/4/2012</a:t>
+              <a:t>10/5/2012</a:t>
             </a:fld>
             <a:endParaRPr lang="en-US" dirty="0"/>
           </a:p>
@@ -940,7 +940,7 @@
             <a:fld id="{1D8BD707-D9CF-40AE-B4C6-C98DA3205C09}" type="datetimeFigureOut">
               <a:rPr lang="en-US" smtClean="0"/>
               <a:pPr/>
-              <a:t>10/4/2012</a:t>
+              <a:t>10/5/2012</a:t>
             </a:fld>
             <a:endParaRPr lang="en-US" dirty="0"/>
           </a:p>
@@ -1127,7 +1127,7 @@
             <a:fld id="{1D8BD707-D9CF-40AE-B4C6-C98DA3205C09}" type="datetimeFigureOut">
               <a:rPr lang="en-US" smtClean="0"/>
               <a:pPr/>
-              <a:t>10/4/2012</a:t>
+              <a:t>10/5/2012</a:t>
             </a:fld>
             <a:endParaRPr lang="en-US" dirty="0"/>
           </a:p>
@@ -1279,7 +1279,7 @@
             <a:fld id="{1D8BD707-D9CF-40AE-B4C6-C98DA3205C09}" type="datetimeFigureOut">
               <a:rPr lang="en-US" smtClean="0"/>
               <a:pPr/>
-              <a:t>10/4/2012</a:t>
+              <a:t>10/5/2012</a:t>
             </a:fld>
             <a:endParaRPr lang="en-US" dirty="0"/>
           </a:p>
@@ -1536,7 +1536,7 @@
             <a:fld id="{1D8BD707-D9CF-40AE-B4C6-C98DA3205C09}" type="datetimeFigureOut">
               <a:rPr lang="en-US" smtClean="0"/>
               <a:pPr/>
-              <a:t>10/4/2012</a:t>
+              <a:t>10/5/2012</a:t>
             </a:fld>
             <a:endParaRPr lang="en-US" dirty="0"/>
           </a:p>
@@ -1947,7 +1947,7 @@
             <a:fld id="{1D8BD707-D9CF-40AE-B4C6-C98DA3205C09}" type="datetimeFigureOut">
               <a:rPr lang="en-US" smtClean="0"/>
               <a:pPr/>
-              <a:t>10/4/2012</a:t>
+              <a:t>10/5/2012</a:t>
             </a:fld>
             <a:endParaRPr lang="en-US" dirty="0"/>
           </a:p>
@@ -2395,7 +2395,7 @@
             <a:fld id="{1D8BD707-D9CF-40AE-B4C6-C98DA3205C09}" type="datetimeFigureOut">
               <a:rPr lang="en-US" smtClean="0"/>
               <a:pPr/>
-              <a:t>10/4/2012</a:t>
+              <a:t>10/5/2012</a:t>
             </a:fld>
             <a:endParaRPr lang="en-US" dirty="0"/>
           </a:p>
@@ -2498,7 +2498,7 @@
             <a:fld id="{1D8BD707-D9CF-40AE-B4C6-C98DA3205C09}" type="datetimeFigureOut">
               <a:rPr lang="en-US" smtClean="0"/>
               <a:pPr/>
-              <a:t>10/4/2012</a:t>
+              <a:t>10/5/2012</a:t>
             </a:fld>
             <a:endParaRPr lang="en-US" dirty="0"/>
           </a:p>
@@ -2621,7 +2621,7 @@
             <a:fld id="{1D8BD707-D9CF-40AE-B4C6-C98DA3205C09}" type="datetimeFigureOut">
               <a:rPr lang="en-US" smtClean="0"/>
               <a:pPr/>
-              <a:t>10/4/2012</a:t>
+              <a:t>10/5/2012</a:t>
             </a:fld>
             <a:endParaRPr lang="en-US" dirty="0"/>
           </a:p>
@@ -2897,7 +2897,7 @@
             <a:fld id="{1D8BD707-D9CF-40AE-B4C6-C98DA3205C09}" type="datetimeFigureOut">
               <a:rPr lang="en-US" smtClean="0"/>
               <a:pPr/>
-              <a:t>10/4/2012</a:t>
+              <a:t>10/5/2012</a:t>
             </a:fld>
             <a:endParaRPr lang="en-US" dirty="0"/>
           </a:p>
@@ -3104,7 +3104,7 @@
             <a:fld id="{1D8BD707-D9CF-40AE-B4C6-C98DA3205C09}" type="datetimeFigureOut">
               <a:rPr lang="en-US" smtClean="0"/>
               <a:pPr/>
-              <a:t>10/4/2012</a:t>
+              <a:t>10/5/2012</a:t>
             </a:fld>
             <a:endParaRPr lang="en-US" dirty="0"/>
           </a:p>
@@ -4215,7 +4215,7 @@
             <a:fld id="{1D8BD707-D9CF-40AE-B4C6-C98DA3205C09}" type="datetimeFigureOut">
               <a:rPr lang="en-US" smtClean="0"/>
               <a:pPr/>
-              <a:t>10/4/2012</a:t>
+              <a:t>10/5/2012</a:t>
             </a:fld>
             <a:endParaRPr lang="en-US" dirty="0"/>
           </a:p>
@@ -4715,14 +4715,25 @@
           <a:p>
             <a:r>
               <a:rPr lang="en-US" dirty="0" smtClean="0"/>
-              <a:t>JSON</a:t>
-            </a:r>
-          </a:p>
-          <a:p>
+              <a:t>JSON framework</a:t>
+            </a:r>
+          </a:p>
+          <a:p>
+            <a:pPr lvl="1"/>
             <a:r>
               <a:rPr lang="en-US" dirty="0" smtClean="0"/>
-              <a:t>Web Service</a:t>
-            </a:r>
+              <a:t>Lightweight</a:t>
+            </a:r>
+            <a:endParaRPr lang="en-US" dirty="0" smtClean="0"/>
+          </a:p>
+          <a:p>
+            <a:r>
+              <a:rPr lang="en-US" dirty="0" smtClean="0"/>
+              <a:t>Implemented as a Web Service</a:t>
+            </a:r>
+          </a:p>
+          <a:p>
+            <a:endParaRPr lang="en-US" dirty="0" smtClean="0"/>
           </a:p>
           <a:p>
             <a:endParaRPr lang="en-US" dirty="0"/>
@@ -4746,7 +4757,7 @@
           <a:p>
             <a:r>
               <a:rPr lang="en-US" dirty="0" smtClean="0"/>
-              <a:t>Web Service Interface</a:t>
+              <a:t>API</a:t>
             </a:r>
             <a:endParaRPr lang="en-US" dirty="0"/>
           </a:p>
@@ -5047,8 +5058,23 @@
           <a:p>
             <a:r>
               <a:rPr lang="en-US" dirty="0" smtClean="0"/>
-              <a:t>Interfacing with existing services</a:t>
-            </a:r>
+              <a:t>Interfacing with existing </a:t>
+            </a:r>
+            <a:r>
+              <a:rPr lang="en-US" dirty="0" smtClean="0"/>
+              <a:t>services</a:t>
+            </a:r>
+          </a:p>
+          <a:p>
+            <a:r>
+              <a:rPr lang="en-US" dirty="0" smtClean="0"/>
+              <a:t>PDF display </a:t>
+            </a:r>
+            <a:r>
+              <a:rPr lang="en-US" smtClean="0"/>
+              <a:t>and usage</a:t>
+            </a:r>
+            <a:endParaRPr lang="en-US" dirty="0" smtClean="0"/>
           </a:p>
           <a:p>
             <a:endParaRPr lang="en-US" dirty="0" smtClean="0"/>

</xml_diff>

<commit_message>
changed Elation to eLation
</commit_message>
<xml_diff>
--- a/Documentation/Presentation1.pptx
+++ b/Documentation/Presentation1.pptx
@@ -206,7 +206,7 @@
           <a:p>
             <a:fld id="{26133179-5973-4D61-8651-E006F458E432}" type="datetimeFigureOut">
               <a:rPr lang="en-US" smtClean="0"/>
-              <a:t>10/9/2012</a:t>
+              <a:t>10/10/2012</a:t>
             </a:fld>
             <a:endParaRPr lang="en-US"/>
           </a:p>
@@ -2328,7 +2328,7 @@
             <a:fld id="{1D8BD707-D9CF-40AE-B4C6-C98DA3205C09}" type="datetimeFigureOut">
               <a:rPr lang="en-US" smtClean="0"/>
               <a:pPr/>
-              <a:t>10/9/2012</a:t>
+              <a:t>10/10/2012</a:t>
             </a:fld>
             <a:endParaRPr lang="en-US" dirty="0"/>
           </a:p>
@@ -2526,7 +2526,7 @@
             <a:fld id="{1D8BD707-D9CF-40AE-B4C6-C98DA3205C09}" type="datetimeFigureOut">
               <a:rPr lang="en-US" smtClean="0"/>
               <a:pPr/>
-              <a:t>10/9/2012</a:t>
+              <a:t>10/10/2012</a:t>
             </a:fld>
             <a:endParaRPr lang="en-US" dirty="0"/>
           </a:p>
@@ -2713,7 +2713,7 @@
             <a:fld id="{1D8BD707-D9CF-40AE-B4C6-C98DA3205C09}" type="datetimeFigureOut">
               <a:rPr lang="en-US" smtClean="0"/>
               <a:pPr/>
-              <a:t>10/9/2012</a:t>
+              <a:t>10/10/2012</a:t>
             </a:fld>
             <a:endParaRPr lang="en-US" dirty="0"/>
           </a:p>
@@ -2865,7 +2865,7 @@
             <a:fld id="{1D8BD707-D9CF-40AE-B4C6-C98DA3205C09}" type="datetimeFigureOut">
               <a:rPr lang="en-US" smtClean="0"/>
               <a:pPr/>
-              <a:t>10/9/2012</a:t>
+              <a:t>10/10/2012</a:t>
             </a:fld>
             <a:endParaRPr lang="en-US" dirty="0"/>
           </a:p>
@@ -3122,7 +3122,7 @@
             <a:fld id="{1D8BD707-D9CF-40AE-B4C6-C98DA3205C09}" type="datetimeFigureOut">
               <a:rPr lang="en-US" smtClean="0"/>
               <a:pPr/>
-              <a:t>10/9/2012</a:t>
+              <a:t>10/10/2012</a:t>
             </a:fld>
             <a:endParaRPr lang="en-US" dirty="0"/>
           </a:p>
@@ -3533,7 +3533,7 @@
             <a:fld id="{1D8BD707-D9CF-40AE-B4C6-C98DA3205C09}" type="datetimeFigureOut">
               <a:rPr lang="en-US" smtClean="0"/>
               <a:pPr/>
-              <a:t>10/9/2012</a:t>
+              <a:t>10/10/2012</a:t>
             </a:fld>
             <a:endParaRPr lang="en-US" dirty="0"/>
           </a:p>
@@ -3981,7 +3981,7 @@
             <a:fld id="{1D8BD707-D9CF-40AE-B4C6-C98DA3205C09}" type="datetimeFigureOut">
               <a:rPr lang="en-US" smtClean="0"/>
               <a:pPr/>
-              <a:t>10/9/2012</a:t>
+              <a:t>10/10/2012</a:t>
             </a:fld>
             <a:endParaRPr lang="en-US" dirty="0"/>
           </a:p>
@@ -4084,7 +4084,7 @@
             <a:fld id="{1D8BD707-D9CF-40AE-B4C6-C98DA3205C09}" type="datetimeFigureOut">
               <a:rPr lang="en-US" smtClean="0"/>
               <a:pPr/>
-              <a:t>10/9/2012</a:t>
+              <a:t>10/10/2012</a:t>
             </a:fld>
             <a:endParaRPr lang="en-US" dirty="0"/>
           </a:p>
@@ -4207,7 +4207,7 @@
             <a:fld id="{1D8BD707-D9CF-40AE-B4C6-C98DA3205C09}" type="datetimeFigureOut">
               <a:rPr lang="en-US" smtClean="0"/>
               <a:pPr/>
-              <a:t>10/9/2012</a:t>
+              <a:t>10/10/2012</a:t>
             </a:fld>
             <a:endParaRPr lang="en-US" dirty="0"/>
           </a:p>
@@ -4483,7 +4483,7 @@
             <a:fld id="{1D8BD707-D9CF-40AE-B4C6-C98DA3205C09}" type="datetimeFigureOut">
               <a:rPr lang="en-US" smtClean="0"/>
               <a:pPr/>
-              <a:t>10/9/2012</a:t>
+              <a:t>10/10/2012</a:t>
             </a:fld>
             <a:endParaRPr lang="en-US" dirty="0"/>
           </a:p>
@@ -4690,7 +4690,7 @@
             <a:fld id="{1D8BD707-D9CF-40AE-B4C6-C98DA3205C09}" type="datetimeFigureOut">
               <a:rPr lang="en-US" smtClean="0"/>
               <a:pPr/>
-              <a:t>10/9/2012</a:t>
+              <a:t>10/10/2012</a:t>
             </a:fld>
             <a:endParaRPr lang="en-US" dirty="0"/>
           </a:p>
@@ -5801,7 +5801,7 @@
             <a:fld id="{1D8BD707-D9CF-40AE-B4C6-C98DA3205C09}" type="datetimeFigureOut">
               <a:rPr lang="en-US" smtClean="0"/>
               <a:pPr/>
-              <a:t>10/9/2012</a:t>
+              <a:t>10/10/2012</a:t>
             </a:fld>
             <a:endParaRPr lang="en-US" dirty="0"/>
           </a:p>
@@ -7384,7 +7384,23 @@
             <a:pPr lvl="0"/>
             <a:r>
               <a:rPr lang="en-US" sz="3400" dirty="0"/>
-              <a:t>Add appeal to the already existing Elation product  </a:t>
+              <a:t>Add appeal to the already existing </a:t>
+            </a:r>
+            <a:r>
+              <a:rPr lang="en-US" sz="3400" dirty="0" err="1" smtClean="0"/>
+              <a:t>eL</a:t>
+            </a:r>
+            <a:r>
+              <a:rPr lang="en-US" sz="3400" dirty="0" err="1" smtClean="0"/>
+              <a:t>ation</a:t>
+            </a:r>
+            <a:r>
+              <a:rPr lang="en-US" sz="3400" dirty="0" smtClean="0"/>
+              <a:t> </a:t>
+            </a:r>
+            <a:r>
+              <a:rPr lang="en-US" sz="3400" dirty="0"/>
+              <a:t>product  </a:t>
             </a:r>
           </a:p>
           <a:p>
@@ -7912,11 +7928,7 @@
             </a:pPr>
             <a:r>
               <a:rPr lang="en-US" dirty="0" smtClean="0"/>
-              <a:t>PDF display and </a:t>
-            </a:r>
-            <a:r>
-              <a:rPr lang="en-US" dirty="0" smtClean="0"/>
-              <a:t>usage</a:t>
+              <a:t>PDF display and usage</a:t>
             </a:r>
           </a:p>
           <a:p>
@@ -7940,7 +7952,6 @@
               <a:rPr lang="en-US" dirty="0" smtClean="0"/>
               <a:t>Tablet and Mobile Device Compatibility</a:t>
             </a:r>
-            <a:endParaRPr lang="en-US" dirty="0" smtClean="0"/>
           </a:p>
           <a:p>
             <a:endParaRPr lang="en-US" dirty="0" smtClean="0"/>
@@ -8571,15 +8582,7 @@
           <a:p>
             <a:r>
               <a:rPr lang="en-US" dirty="0" smtClean="0"/>
-              <a:t>Using two Mac’s and </a:t>
-            </a:r>
-            <a:r>
-              <a:rPr lang="en-US" dirty="0" smtClean="0"/>
-              <a:t>two PCs </a:t>
-            </a:r>
-            <a:r>
-              <a:rPr lang="en-US" dirty="0" smtClean="0"/>
-              <a:t>for development</a:t>
+              <a:t>Using two Mac’s and two PCs for development</a:t>
             </a:r>
           </a:p>
           <a:p>
@@ -8599,13 +8602,8 @@
             <a:pPr lvl="1"/>
             <a:r>
               <a:rPr lang="en-US" dirty="0" smtClean="0"/>
-              <a:t>Samsung Galaxy SIII, Nexus </a:t>
-            </a:r>
-            <a:r>
-              <a:rPr lang="en-US" dirty="0" smtClean="0"/>
-              <a:t>7, Droid Pro II</a:t>
-            </a:r>
-            <a:endParaRPr lang="en-US" dirty="0" smtClean="0"/>
+              <a:t>Samsung Galaxy SIII, Nexus 7, Droid Pro II</a:t>
+            </a:r>
           </a:p>
           <a:p>
             <a:r>
@@ -8641,7 +8639,6 @@
               <a:rPr lang="en-US" dirty="0" smtClean="0"/>
               <a:t>API via JSON</a:t>
             </a:r>
-            <a:endParaRPr lang="en-US" dirty="0" smtClean="0"/>
           </a:p>
           <a:p>
             <a:r>

</xml_diff>